<commit_message>
Modified presentation and report as per mentor feedback
</commit_message>
<xml_diff>
--- a/Final/Capstone_2_Project_Presentation.pptx
+++ b/Final/Capstone_2_Project_Presentation.pptx
@@ -387,7 +387,7 @@
           <a:p>
             <a:fld id="{9184DA70-C731-4C70-880D-CCD4705E623C}" type="datetime1">
               <a:rPr lang="en-US" smtClean="0"/>
-              <a:t>3/1/2021</a:t>
+              <a:t>3/15/2021</a:t>
             </a:fld>
             <a:endParaRPr lang="en-US" dirty="0"/>
           </a:p>
@@ -575,7 +575,7 @@
           <a:p>
             <a:fld id="{B612A279-0833-481D-8C56-F67FD0AC6C50}" type="datetime1">
               <a:rPr lang="en-US" smtClean="0"/>
-              <a:t>3/1/2021</a:t>
+              <a:t>3/15/2021</a:t>
             </a:fld>
             <a:endParaRPr lang="en-US" dirty="0"/>
           </a:p>
@@ -817,7 +817,7 @@
           <a:p>
             <a:fld id="{6587DA83-5663-4C9C-B9AA-0B40A3DAFF81}" type="datetime1">
               <a:rPr lang="en-US" smtClean="0"/>
-              <a:t>3/1/2021</a:t>
+              <a:t>3/15/2021</a:t>
             </a:fld>
             <a:endParaRPr lang="en-US" dirty="0"/>
           </a:p>
@@ -1005,7 +1005,7 @@
           <a:p>
             <a:fld id="{4BE1D723-8F53-4F53-90B0-1982A396982E}" type="datetime1">
               <a:rPr lang="en-US" smtClean="0"/>
-              <a:t>3/1/2021</a:t>
+              <a:t>3/15/2021</a:t>
             </a:fld>
             <a:endParaRPr lang="en-US" dirty="0"/>
           </a:p>
@@ -1378,7 +1378,7 @@
           <a:p>
             <a:fld id="{97669AF7-7BEB-44E4-9852-375E34362B5B}" type="datetime1">
               <a:rPr lang="en-US" smtClean="0"/>
-              <a:t>3/1/2021</a:t>
+              <a:t>3/15/2021</a:t>
             </a:fld>
             <a:endParaRPr lang="en-US" dirty="0"/>
           </a:p>
@@ -1633,7 +1633,7 @@
           <a:p>
             <a:fld id="{BAAAC38D-0552-4C82-B593-E6124DFADBE2}" type="datetime1">
               <a:rPr lang="en-US" smtClean="0"/>
-              <a:t>3/1/2021</a:t>
+              <a:t>3/15/2021</a:t>
             </a:fld>
             <a:endParaRPr lang="en-US" dirty="0"/>
           </a:p>
@@ -2030,7 +2030,7 @@
           <a:p>
             <a:fld id="{D9DF0F1C-5577-4ACB-BB62-DF8F3C494C7E}" type="datetime1">
               <a:rPr lang="en-US" smtClean="0"/>
-              <a:t>3/1/2021</a:t>
+              <a:t>3/15/2021</a:t>
             </a:fld>
             <a:endParaRPr lang="en-US" dirty="0"/>
           </a:p>
@@ -2166,7 +2166,7 @@
           <a:p>
             <a:fld id="{1775B394-D9F9-4F0C-B15D-605F45CB9E9F}" type="datetime1">
               <a:rPr lang="en-US" smtClean="0"/>
-              <a:t>3/1/2021</a:t>
+              <a:t>3/15/2021</a:t>
             </a:fld>
             <a:endParaRPr lang="en-US" dirty="0"/>
           </a:p>
@@ -2323,7 +2323,7 @@
           <a:p>
             <a:fld id="{39667345-2558-425A-8533-9BFDBCE15005}" type="datetime1">
               <a:rPr lang="en-US" smtClean="0"/>
-              <a:t>3/1/2021</a:t>
+              <a:t>3/15/2021</a:t>
             </a:fld>
             <a:endParaRPr lang="en-US" dirty="0"/>
           </a:p>
@@ -2652,7 +2652,7 @@
           <a:p>
             <a:fld id="{92BEA474-078D-4E9B-9B14-09A87B19DC46}" type="datetime1">
               <a:rPr lang="en-US" smtClean="0"/>
-              <a:t>3/1/2021</a:t>
+              <a:t>3/15/2021</a:t>
             </a:fld>
             <a:endParaRPr lang="en-US" dirty="0"/>
           </a:p>
@@ -3002,7 +3002,7 @@
           <a:p>
             <a:fld id="{4907D986-8816-4272-A432-0437A28A9828}" type="datetime1">
               <a:rPr lang="en-US" smtClean="0"/>
-              <a:t>3/1/2021</a:t>
+              <a:t>3/15/2021</a:t>
             </a:fld>
             <a:endParaRPr lang="en-US" dirty="0"/>
           </a:p>
@@ -3263,7 +3263,7 @@
           <a:p>
             <a:fld id="{62D6E202-B606-4609-B914-27C9371A1F6D}" type="datetime1">
               <a:rPr lang="en-US" smtClean="0"/>
-              <a:t>3/1/2021</a:t>
+              <a:t>3/15/2021</a:t>
             </a:fld>
             <a:endParaRPr lang="en-US" dirty="0"/>
           </a:p>
@@ -4132,36 +4132,44 @@
           </a:bodyPr>
           <a:lstStyle/>
           <a:p>
-            <a:endParaRPr lang="en-US" dirty="0"/>
-          </a:p>
-          <a:p>
             <a:r>
               <a:rPr lang="en-US" sz="1800" dirty="0">
-                <a:effectLst/>
                 <a:latin typeface="Calibri" panose="020F0502020204030204" pitchFamily="34" charset="0"/>
-                <a:ea typeface="Times New Roman" panose="02020603050405020304" pitchFamily="18" charset="0"/>
                 <a:cs typeface="Calibri" panose="020F0502020204030204" pitchFamily="34" charset="0"/>
               </a:rPr>
               <a:t>NLP can be applied to </a:t>
             </a:r>
             <a:r>
               <a:rPr lang="en-US" sz="1800" dirty="0" err="1">
-                <a:effectLst/>
                 <a:latin typeface="Calibri" panose="020F0502020204030204" pitchFamily="34" charset="0"/>
-                <a:ea typeface="Times New Roman" panose="02020603050405020304" pitchFamily="18" charset="0"/>
                 <a:cs typeface="Calibri" panose="020F0502020204030204" pitchFamily="34" charset="0"/>
               </a:rPr>
               <a:t>Job_Desc</a:t>
             </a:r>
             <a:r>
               <a:rPr lang="en-US" sz="1800" dirty="0">
-                <a:effectLst/>
                 <a:latin typeface="Calibri" panose="020F0502020204030204" pitchFamily="34" charset="0"/>
-                <a:ea typeface="Times New Roman" panose="02020603050405020304" pitchFamily="18" charset="0"/>
                 <a:cs typeface="Calibri" panose="020F0502020204030204" pitchFamily="34" charset="0"/>
               </a:rPr>
-              <a:t> to try and find correlations with the actual text and the salary. We tried a version of this by extracting keywords such as Python, R, Scala, etc.</a:t>
-            </a:r>
+              <a:t> to try and find correlations with the actual text and the salary, since some companies might be more specific about the role they </a:t>
+            </a:r>
+            <a:r>
+              <a:rPr lang="en-US" sz="1800" dirty="0" err="1">
+                <a:latin typeface="Calibri" panose="020F0502020204030204" pitchFamily="34" charset="0"/>
+                <a:cs typeface="Calibri" panose="020F0502020204030204" pitchFamily="34" charset="0"/>
+              </a:rPr>
+              <a:t>aree</a:t>
+            </a:r>
+            <a:r>
+              <a:rPr lang="en-US" sz="1800" dirty="0">
+                <a:latin typeface="Calibri" panose="020F0502020204030204" pitchFamily="34" charset="0"/>
+                <a:cs typeface="Calibri" panose="020F0502020204030204" pitchFamily="34" charset="0"/>
+              </a:rPr>
+              <a:t> trying to fill and have a better understanding of the market.</a:t>
+            </a:r>
+            <a:br>
+              <a:rPr lang="en-US" sz="1600" dirty="0"/>
+            </a:br>
             <a:endParaRPr lang="en-US" sz="1800" dirty="0">
               <a:effectLst/>
               <a:latin typeface="Calibri" panose="020F0502020204030204" pitchFamily="34" charset="0"/>
@@ -4524,14 +4532,11 @@
           <a:p>
             <a:r>
               <a:rPr lang="en-US" sz="4000" dirty="0"/>
-              <a:t>A supervised regression model is needed to predict the salary for a Data Science position.</a:t>
+              <a:t>Predict the salary for positions in the Data Science field accordingly to the current market.</a:t>
             </a:r>
             <a:endParaRPr lang="en-US" sz="4000" b="0" i="0" u="none" strike="noStrike" dirty="0">
               <a:effectLst/>
             </a:endParaRPr>
-          </a:p>
-          <a:p>
-            <a:endParaRPr lang="en-US" sz="1800" dirty="0"/>
           </a:p>
         </p:txBody>
       </p:sp>
@@ -7130,7 +7135,15 @@
             </a:pPr>
             <a:r>
               <a:rPr lang="en-US" dirty="0"/>
-              <a:t> Original dataset had a range bigger than 2xMAE</a:t>
+              <a:t> Original dataset had </a:t>
+            </a:r>
+            <a:r>
+              <a:rPr lang="en-US"/>
+              <a:t>a salary range </a:t>
+            </a:r>
+            <a:r>
+              <a:rPr lang="en-US" dirty="0"/>
+              <a:t>bigger than 2xMAE</a:t>
             </a:r>
           </a:p>
           <a:p>

</xml_diff>